<commit_message>
Unit test Update. Please, don't merge yet. There is an issue with the timer.
</commit_message>
<xml_diff>
--- a/org.mwc.debrief.legacy/test_data/master_template/long_tracks/long_tracks_temp.pptx
+++ b/org.mwc.debrief.legacy/test_data/master_template/long_tracks/long_tracks_temp.pptx
@@ -11246,7 +11246,7 @@
                 <a:ea typeface="Open Sans" panose="020B0606030504020204" pitchFamily="34" charset="0"/>
                 <a:cs typeface="Courier New" panose="02070309020205020404" pitchFamily="49" charset="0"/>
               </a:rPr>
-              <a:t>95 Dec 121015</a:t>
+              <a:t>1995-12-12T10:15:31Z</a:t>
             </a:r>
           </a:p>
         </p:txBody>
@@ -11379,7 +11379,7 @@
                 <a:ea typeface="Open Sans" panose="020B0606030504020204" pitchFamily="34" charset="0"/>
                 <a:cs typeface="Courier New" panose="02070309020205020404" pitchFamily="49" charset="0"/>
               </a:rPr>
-              <a:t>95 Dec 121016</a:t>
+              <a:t>1995-12-12T10:16:31Z</a:t>
             </a:r>
           </a:p>
         </p:txBody>
@@ -11512,7 +11512,7 @@
                 <a:ea typeface="Open Sans" panose="020B0606030504020204" pitchFamily="34" charset="0"/>
                 <a:cs typeface="Courier New" panose="02070309020205020404" pitchFamily="49" charset="0"/>
               </a:rPr>
-              <a:t>95 Dec 121017</a:t>
+              <a:t>1995-12-12T10:17:31Z</a:t>
             </a:r>
           </a:p>
         </p:txBody>
@@ -11645,7 +11645,7 @@
                 <a:ea typeface="Open Sans" panose="020B0606030504020204" pitchFamily="34" charset="0"/>
                 <a:cs typeface="Courier New" panose="02070309020205020404" pitchFamily="49" charset="0"/>
               </a:rPr>
-              <a:t>95 Dec 121018</a:t>
+              <a:t>1995-12-12T10:18:31Z</a:t>
             </a:r>
           </a:p>
         </p:txBody>
@@ -11778,7 +11778,7 @@
                 <a:ea typeface="Open Sans" panose="020B0606030504020204" pitchFamily="34" charset="0"/>
                 <a:cs typeface="Courier New" panose="02070309020205020404" pitchFamily="49" charset="0"/>
               </a:rPr>
-              <a:t>95 Dec 121019</a:t>
+              <a:t>1995-12-12T10:19:31Z</a:t>
             </a:r>
           </a:p>
         </p:txBody>
@@ -11911,7 +11911,7 @@
                 <a:ea typeface="Open Sans" panose="020B0606030504020204" pitchFamily="34" charset="0"/>
                 <a:cs typeface="Courier New" panose="02070309020205020404" pitchFamily="49" charset="0"/>
               </a:rPr>
-              <a:t>95 Dec 121020</a:t>
+              <a:t>1995-12-12T10:20:31Z</a:t>
             </a:r>
           </a:p>
         </p:txBody>
@@ -12044,7 +12044,7 @@
                 <a:ea typeface="Open Sans" panose="020B0606030504020204" pitchFamily="34" charset="0"/>
                 <a:cs typeface="Courier New" panose="02070309020205020404" pitchFamily="49" charset="0"/>
               </a:rPr>
-              <a:t>95 Dec 121021</a:t>
+              <a:t>1995-12-12T10:21:31Z</a:t>
             </a:r>
           </a:p>
         </p:txBody>
@@ -12177,7 +12177,7 @@
                 <a:ea typeface="Open Sans" panose="020B0606030504020204" pitchFamily="34" charset="0"/>
                 <a:cs typeface="Courier New" panose="02070309020205020404" pitchFamily="49" charset="0"/>
               </a:rPr>
-              <a:t>95 Dec 121022</a:t>
+              <a:t>1995-12-12T10:22:31Z</a:t>
             </a:r>
           </a:p>
         </p:txBody>
@@ -12310,7 +12310,7 @@
                 <a:ea typeface="Open Sans" panose="020B0606030504020204" pitchFamily="34" charset="0"/>
                 <a:cs typeface="Courier New" panose="02070309020205020404" pitchFamily="49" charset="0"/>
               </a:rPr>
-              <a:t>95 Dec 121023</a:t>
+              <a:t>1995-12-12T10:23:31Z</a:t>
             </a:r>
           </a:p>
         </p:txBody>
@@ -12443,7 +12443,7 @@
                 <a:ea typeface="Open Sans" panose="020B0606030504020204" pitchFamily="34" charset="0"/>
                 <a:cs typeface="Courier New" panose="02070309020205020404" pitchFamily="49" charset="0"/>
               </a:rPr>
-              <a:t>95 Dec 121024</a:t>
+              <a:t>1995-12-12T10:24:31Z</a:t>
             </a:r>
           </a:p>
         </p:txBody>
@@ -12576,7 +12576,7 @@
                 <a:ea typeface="Open Sans" panose="020B0606030504020204" pitchFamily="34" charset="0"/>
                 <a:cs typeface="Courier New" panose="02070309020205020404" pitchFamily="49" charset="0"/>
               </a:rPr>
-              <a:t>95 Dec 121025</a:t>
+              <a:t>1995-12-12T10:25:31Z</a:t>
             </a:r>
           </a:p>
         </p:txBody>
@@ -12709,7 +12709,7 @@
                 <a:ea typeface="Open Sans" panose="020B0606030504020204" pitchFamily="34" charset="0"/>
                 <a:cs typeface="Courier New" panose="02070309020205020404" pitchFamily="49" charset="0"/>
               </a:rPr>
-              <a:t>95 Dec 121026</a:t>
+              <a:t>1995-12-12T10:26:31Z</a:t>
             </a:r>
           </a:p>
         </p:txBody>
@@ -12842,7 +12842,7 @@
                 <a:ea typeface="Open Sans" panose="020B0606030504020204" pitchFamily="34" charset="0"/>
                 <a:cs typeface="Courier New" panose="02070309020205020404" pitchFamily="49" charset="0"/>
               </a:rPr>
-              <a:t>95 Dec 121027</a:t>
+              <a:t>1995-12-12T10:27:31Z</a:t>
             </a:r>
           </a:p>
         </p:txBody>
@@ -12975,7 +12975,7 @@
                 <a:ea typeface="Open Sans" panose="020B0606030504020204" pitchFamily="34" charset="0"/>
                 <a:cs typeface="Courier New" panose="02070309020205020404" pitchFamily="49" charset="0"/>
               </a:rPr>
-              <a:t>95 Dec 121028</a:t>
+              <a:t>1995-12-12T10:28:31Z</a:t>
             </a:r>
           </a:p>
         </p:txBody>
@@ -13108,7 +13108,7 @@
                 <a:ea typeface="Open Sans" panose="020B0606030504020204" pitchFamily="34" charset="0"/>
                 <a:cs typeface="Courier New" panose="02070309020205020404" pitchFamily="49" charset="0"/>
               </a:rPr>
-              <a:t>95 Dec 121029</a:t>
+              <a:t>1995-12-12T10:29:31Z</a:t>
             </a:r>
           </a:p>
         </p:txBody>
@@ -13241,7 +13241,7 @@
                 <a:ea typeface="Open Sans" panose="020B0606030504020204" pitchFamily="34" charset="0"/>
                 <a:cs typeface="Courier New" panose="02070309020205020404" pitchFamily="49" charset="0"/>
               </a:rPr>
-              <a:t>95 Dec 121030</a:t>
+              <a:t>1995-12-12T10:30:31Z</a:t>
             </a:r>
           </a:p>
         </p:txBody>
@@ -13374,7 +13374,7 @@
                 <a:ea typeface="Open Sans" panose="020B0606030504020204" pitchFamily="34" charset="0"/>
                 <a:cs typeface="Courier New" panose="02070309020205020404" pitchFamily="49" charset="0"/>
               </a:rPr>
-              <a:t>95 Dec 121031</a:t>
+              <a:t>1995-12-12T10:31:31Z</a:t>
             </a:r>
           </a:p>
         </p:txBody>
@@ -13507,7 +13507,7 @@
                 <a:ea typeface="Open Sans" panose="020B0606030504020204" pitchFamily="34" charset="0"/>
                 <a:cs typeface="Courier New" panose="02070309020205020404" pitchFamily="49" charset="0"/>
               </a:rPr>
-              <a:t>95 Dec 121032</a:t>
+              <a:t>1995-12-12T10:32:31Z</a:t>
             </a:r>
           </a:p>
         </p:txBody>
@@ -13640,7 +13640,7 @@
                 <a:ea typeface="Open Sans" panose="020B0606030504020204" pitchFamily="34" charset="0"/>
                 <a:cs typeface="Courier New" panose="02070309020205020404" pitchFamily="49" charset="0"/>
               </a:rPr>
-              <a:t>95 Dec 121033</a:t>
+              <a:t>1995-12-12T10:33:31Z</a:t>
             </a:r>
           </a:p>
         </p:txBody>
@@ -13773,7 +13773,7 @@
                 <a:ea typeface="Open Sans" panose="020B0606030504020204" pitchFamily="34" charset="0"/>
                 <a:cs typeface="Courier New" panose="02070309020205020404" pitchFamily="49" charset="0"/>
               </a:rPr>
-              <a:t>95 Dec 121034</a:t>
+              <a:t>1995-12-12T10:34:31Z</a:t>
             </a:r>
           </a:p>
         </p:txBody>
@@ -13906,7 +13906,7 @@
                 <a:ea typeface="Open Sans" panose="020B0606030504020204" pitchFamily="34" charset="0"/>
                 <a:cs typeface="Courier New" panose="02070309020205020404" pitchFamily="49" charset="0"/>
               </a:rPr>
-              <a:t>95 Dec 121035</a:t>
+              <a:t>1995-12-12T10:35:31Z</a:t>
             </a:r>
           </a:p>
         </p:txBody>
@@ -14039,7 +14039,7 @@
                 <a:ea typeface="Open Sans" panose="020B0606030504020204" pitchFamily="34" charset="0"/>
                 <a:cs typeface="Courier New" panose="02070309020205020404" pitchFamily="49" charset="0"/>
               </a:rPr>
-              <a:t>95 Dec 121036</a:t>
+              <a:t>1995-12-12T10:36:31Z</a:t>
             </a:r>
           </a:p>
         </p:txBody>
@@ -14172,7 +14172,7 @@
                 <a:ea typeface="Open Sans" panose="020B0606030504020204" pitchFamily="34" charset="0"/>
                 <a:cs typeface="Courier New" panose="02070309020205020404" pitchFamily="49" charset="0"/>
               </a:rPr>
-              <a:t>95 Dec 121037</a:t>
+              <a:t>1995-12-12T10:37:31Z</a:t>
             </a:r>
           </a:p>
         </p:txBody>
@@ -14305,7 +14305,7 @@
                 <a:ea typeface="Open Sans" panose="020B0606030504020204" pitchFamily="34" charset="0"/>
                 <a:cs typeface="Courier New" panose="02070309020205020404" pitchFamily="49" charset="0"/>
               </a:rPr>
-              <a:t>95 Dec 121038</a:t>
+              <a:t>1995-12-12T10:38:31Z</a:t>
             </a:r>
           </a:p>
         </p:txBody>
@@ -14438,7 +14438,7 @@
                 <a:ea typeface="Open Sans" panose="020B0606030504020204" pitchFamily="34" charset="0"/>
                 <a:cs typeface="Courier New" panose="02070309020205020404" pitchFamily="49" charset="0"/>
               </a:rPr>
-              <a:t>95 Dec 121039</a:t>
+              <a:t>1995-12-12T10:39:31Z</a:t>
             </a:r>
           </a:p>
         </p:txBody>
@@ -14571,7 +14571,7 @@
                 <a:ea typeface="Open Sans" panose="020B0606030504020204" pitchFamily="34" charset="0"/>
                 <a:cs typeface="Courier New" panose="02070309020205020404" pitchFamily="49" charset="0"/>
               </a:rPr>
-              <a:t>95 Dec 121040</a:t>
+              <a:t>1995-12-12T10:40:31Z</a:t>
             </a:r>
           </a:p>
         </p:txBody>
@@ -14704,7 +14704,7 @@
                 <a:ea typeface="Open Sans" panose="020B0606030504020204" pitchFamily="34" charset="0"/>
                 <a:cs typeface="Courier New" panose="02070309020205020404" pitchFamily="49" charset="0"/>
               </a:rPr>
-              <a:t>95 Dec 121041</a:t>
+              <a:t>1995-12-12T10:41:31Z</a:t>
             </a:r>
           </a:p>
         </p:txBody>
@@ -14837,7 +14837,7 @@
                 <a:ea typeface="Open Sans" panose="020B0606030504020204" pitchFamily="34" charset="0"/>
                 <a:cs typeface="Courier New" panose="02070309020205020404" pitchFamily="49" charset="0"/>
               </a:rPr>
-              <a:t>95 Dec 121042</a:t>
+              <a:t>1995-12-12T10:42:31Z</a:t>
             </a:r>
           </a:p>
         </p:txBody>
@@ -14970,7 +14970,7 @@
                 <a:ea typeface="Open Sans" panose="020B0606030504020204" pitchFamily="34" charset="0"/>
                 <a:cs typeface="Courier New" panose="02070309020205020404" pitchFamily="49" charset="0"/>
               </a:rPr>
-              <a:t>95 Dec 121043</a:t>
+              <a:t>1995-12-12T10:43:31Z</a:t>
             </a:r>
           </a:p>
         </p:txBody>
@@ -15103,7 +15103,7 @@
                 <a:ea typeface="Open Sans" panose="020B0606030504020204" pitchFamily="34" charset="0"/>
                 <a:cs typeface="Courier New" panose="02070309020205020404" pitchFamily="49" charset="0"/>
               </a:rPr>
-              <a:t>95 Dec 121044</a:t>
+              <a:t>1995-12-12T10:44:31Z</a:t>
             </a:r>
           </a:p>
         </p:txBody>
@@ -15236,7 +15236,7 @@
                 <a:ea typeface="Open Sans" panose="020B0606030504020204" pitchFamily="34" charset="0"/>
                 <a:cs typeface="Courier New" panose="02070309020205020404" pitchFamily="49" charset="0"/>
               </a:rPr>
-              <a:t>95 Dec 121045</a:t>
+              <a:t>1995-12-12T10:45:31Z</a:t>
             </a:r>
           </a:p>
         </p:txBody>
@@ -15369,7 +15369,7 @@
                 <a:ea typeface="Open Sans" panose="020B0606030504020204" pitchFamily="34" charset="0"/>
                 <a:cs typeface="Courier New" panose="02070309020205020404" pitchFamily="49" charset="0"/>
               </a:rPr>
-              <a:t>95 Dec 121046</a:t>
+              <a:t>1995-12-12T10:46:31Z</a:t>
             </a:r>
           </a:p>
         </p:txBody>
@@ -15502,7 +15502,7 @@
                 <a:ea typeface="Open Sans" panose="020B0606030504020204" pitchFamily="34" charset="0"/>
                 <a:cs typeface="Courier New" panose="02070309020205020404" pitchFamily="49" charset="0"/>
               </a:rPr>
-              <a:t>95 Dec 121047</a:t>
+              <a:t>1995-12-12T10:47:31Z</a:t>
             </a:r>
           </a:p>
         </p:txBody>
@@ -15635,7 +15635,7 @@
                 <a:ea typeface="Open Sans" panose="020B0606030504020204" pitchFamily="34" charset="0"/>
                 <a:cs typeface="Courier New" panose="02070309020205020404" pitchFamily="49" charset="0"/>
               </a:rPr>
-              <a:t>95 Dec 121048</a:t>
+              <a:t>1995-12-12T10:48:31Z</a:t>
             </a:r>
           </a:p>
         </p:txBody>
@@ -15768,7 +15768,7 @@
                 <a:ea typeface="Open Sans" panose="020B0606030504020204" pitchFamily="34" charset="0"/>
                 <a:cs typeface="Courier New" panose="02070309020205020404" pitchFamily="49" charset="0"/>
               </a:rPr>
-              <a:t>95 Dec 121049</a:t>
+              <a:t>1995-12-12T10:49:31Z</a:t>
             </a:r>
           </a:p>
         </p:txBody>
@@ -15901,7 +15901,7 @@
                 <a:ea typeface="Open Sans" panose="020B0606030504020204" pitchFamily="34" charset="0"/>
                 <a:cs typeface="Courier New" panose="02070309020205020404" pitchFamily="49" charset="0"/>
               </a:rPr>
-              <a:t>95 Dec 121050</a:t>
+              <a:t>1995-12-12T10:50:31Z</a:t>
             </a:r>
           </a:p>
         </p:txBody>
@@ -16034,7 +16034,7 @@
                 <a:ea typeface="Open Sans" panose="020B0606030504020204" pitchFamily="34" charset="0"/>
                 <a:cs typeface="Courier New" panose="02070309020205020404" pitchFamily="49" charset="0"/>
               </a:rPr>
-              <a:t>95 Dec 121051</a:t>
+              <a:t>1995-12-12T10:51:31Z</a:t>
             </a:r>
           </a:p>
         </p:txBody>
@@ -16167,7 +16167,7 @@
                 <a:ea typeface="Open Sans" panose="020B0606030504020204" pitchFamily="34" charset="0"/>
                 <a:cs typeface="Courier New" panose="02070309020205020404" pitchFamily="49" charset="0"/>
               </a:rPr>
-              <a:t>95 Dec 121052</a:t>
+              <a:t>1995-12-12T10:52:31Z</a:t>
             </a:r>
           </a:p>
         </p:txBody>
@@ -16300,7 +16300,7 @@
                 <a:ea typeface="Open Sans" panose="020B0606030504020204" pitchFamily="34" charset="0"/>
                 <a:cs typeface="Courier New" panose="02070309020205020404" pitchFamily="49" charset="0"/>
               </a:rPr>
-              <a:t>95 Dec 121053</a:t>
+              <a:t>1995-12-12T10:53:31Z</a:t>
             </a:r>
           </a:p>
         </p:txBody>
@@ -16433,7 +16433,7 @@
                 <a:ea typeface="Open Sans" panose="020B0606030504020204" pitchFamily="34" charset="0"/>
                 <a:cs typeface="Courier New" panose="02070309020205020404" pitchFamily="49" charset="0"/>
               </a:rPr>
-              <a:t>95 Dec 121054</a:t>
+              <a:t>1995-12-12T10:54:31Z</a:t>
             </a:r>
           </a:p>
         </p:txBody>
@@ -16566,7 +16566,7 @@
                 <a:ea typeface="Open Sans" panose="020B0606030504020204" pitchFamily="34" charset="0"/>
                 <a:cs typeface="Courier New" panose="02070309020205020404" pitchFamily="49" charset="0"/>
               </a:rPr>
-              <a:t>95 Dec 121055</a:t>
+              <a:t>1995-12-12T10:55:31Z</a:t>
             </a:r>
           </a:p>
         </p:txBody>
@@ -16699,7 +16699,7 @@
                 <a:ea typeface="Open Sans" panose="020B0606030504020204" pitchFamily="34" charset="0"/>
                 <a:cs typeface="Courier New" panose="02070309020205020404" pitchFamily="49" charset="0"/>
               </a:rPr>
-              <a:t>95 Dec 121056</a:t>
+              <a:t>1995-12-12T10:56:31Z</a:t>
             </a:r>
           </a:p>
         </p:txBody>
@@ -16832,7 +16832,7 @@
                 <a:ea typeface="Open Sans" panose="020B0606030504020204" pitchFamily="34" charset="0"/>
                 <a:cs typeface="Courier New" panose="02070309020205020404" pitchFamily="49" charset="0"/>
               </a:rPr>
-              <a:t>95 Dec 121057</a:t>
+              <a:t>1995-12-12T10:57:31Z</a:t>
             </a:r>
           </a:p>
         </p:txBody>
@@ -16965,7 +16965,7 @@
                 <a:ea typeface="Open Sans" panose="020B0606030504020204" pitchFamily="34" charset="0"/>
                 <a:cs typeface="Courier New" panose="02070309020205020404" pitchFamily="49" charset="0"/>
               </a:rPr>
-              <a:t>95 Dec 121058</a:t>
+              <a:t>1995-12-12T10:58:31Z</a:t>
             </a:r>
           </a:p>
         </p:txBody>
@@ -17098,7 +17098,7 @@
                 <a:ea typeface="Open Sans" panose="020B0606030504020204" pitchFamily="34" charset="0"/>
                 <a:cs typeface="Courier New" panose="02070309020205020404" pitchFamily="49" charset="0"/>
               </a:rPr>
-              <a:t>95 Dec 121059</a:t>
+              <a:t>1995-12-12T10:59:31Z</a:t>
             </a:r>
           </a:p>
         </p:txBody>
@@ -17231,7 +17231,7 @@
                 <a:ea typeface="Open Sans" panose="020B0606030504020204" pitchFamily="34" charset="0"/>
                 <a:cs typeface="Courier New" panose="02070309020205020404" pitchFamily="49" charset="0"/>
               </a:rPr>
-              <a:t>95 Dec 121100</a:t>
+              <a:t>1995-12-12T11:00:31Z</a:t>
             </a:r>
           </a:p>
         </p:txBody>
@@ -17364,7 +17364,7 @@
                 <a:ea typeface="Open Sans" panose="020B0606030504020204" pitchFamily="34" charset="0"/>
                 <a:cs typeface="Courier New" panose="02070309020205020404" pitchFamily="49" charset="0"/>
               </a:rPr>
-              <a:t>95 Dec 121101</a:t>
+              <a:t>1995-12-12T11:01:31Z</a:t>
             </a:r>
           </a:p>
         </p:txBody>
@@ -17497,7 +17497,7 @@
                 <a:ea typeface="Open Sans" panose="020B0606030504020204" pitchFamily="34" charset="0"/>
                 <a:cs typeface="Courier New" panose="02070309020205020404" pitchFamily="49" charset="0"/>
               </a:rPr>
-              <a:t>95 Dec 121102</a:t>
+              <a:t>1995-12-12T11:02:31Z</a:t>
             </a:r>
           </a:p>
         </p:txBody>
@@ -17630,7 +17630,7 @@
                 <a:ea typeface="Open Sans" panose="020B0606030504020204" pitchFamily="34" charset="0"/>
                 <a:cs typeface="Courier New" panose="02070309020205020404" pitchFamily="49" charset="0"/>
               </a:rPr>
-              <a:t>95 Dec 121103</a:t>
+              <a:t>1995-12-12T11:03:31Z</a:t>
             </a:r>
           </a:p>
         </p:txBody>
@@ -17763,7 +17763,7 @@
                 <a:ea typeface="Open Sans" panose="020B0606030504020204" pitchFamily="34" charset="0"/>
                 <a:cs typeface="Courier New" panose="02070309020205020404" pitchFamily="49" charset="0"/>
               </a:rPr>
-              <a:t>95 Dec 121104</a:t>
+              <a:t>1995-12-12T11:04:31Z</a:t>
             </a:r>
           </a:p>
         </p:txBody>
@@ -17896,7 +17896,7 @@
                 <a:ea typeface="Open Sans" panose="020B0606030504020204" pitchFamily="34" charset="0"/>
                 <a:cs typeface="Courier New" panose="02070309020205020404" pitchFamily="49" charset="0"/>
               </a:rPr>
-              <a:t>95 Dec 121105</a:t>
+              <a:t>1995-12-12T11:05:31Z</a:t>
             </a:r>
           </a:p>
         </p:txBody>
@@ -18029,7 +18029,7 @@
                 <a:ea typeface="Open Sans" panose="020B0606030504020204" pitchFamily="34" charset="0"/>
                 <a:cs typeface="Courier New" panose="02070309020205020404" pitchFamily="49" charset="0"/>
               </a:rPr>
-              <a:t>95 Dec 121106</a:t>
+              <a:t>1995-12-12T11:06:31Z</a:t>
             </a:r>
           </a:p>
         </p:txBody>
@@ -18162,7 +18162,7 @@
                 <a:ea typeface="Open Sans" panose="020B0606030504020204" pitchFamily="34" charset="0"/>
                 <a:cs typeface="Courier New" panose="02070309020205020404" pitchFamily="49" charset="0"/>
               </a:rPr>
-              <a:t>95 Dec 121107</a:t>
+              <a:t>1995-12-12T11:07:31Z</a:t>
             </a:r>
           </a:p>
         </p:txBody>
@@ -18295,7 +18295,7 @@
                 <a:ea typeface="Open Sans" panose="020B0606030504020204" pitchFamily="34" charset="0"/>
                 <a:cs typeface="Courier New" panose="02070309020205020404" pitchFamily="49" charset="0"/>
               </a:rPr>
-              <a:t>95 Dec 121108</a:t>
+              <a:t>1995-12-12T11:08:31Z</a:t>
             </a:r>
           </a:p>
         </p:txBody>
@@ -18428,7 +18428,7 @@
                 <a:ea typeface="Open Sans" panose="020B0606030504020204" pitchFamily="34" charset="0"/>
                 <a:cs typeface="Courier New" panose="02070309020205020404" pitchFamily="49" charset="0"/>
               </a:rPr>
-              <a:t>95 Dec 121109</a:t>
+              <a:t>1995-12-12T11:09:31Z</a:t>
             </a:r>
           </a:p>
         </p:txBody>
@@ -18561,7 +18561,7 @@
                 <a:ea typeface="Open Sans" panose="020B0606030504020204" pitchFamily="34" charset="0"/>
                 <a:cs typeface="Courier New" panose="02070309020205020404" pitchFamily="49" charset="0"/>
               </a:rPr>
-              <a:t>95 Dec 121110</a:t>
+              <a:t>1995-12-12T11:10:31Z</a:t>
             </a:r>
           </a:p>
         </p:txBody>
@@ -18694,7 +18694,7 @@
                 <a:ea typeface="Open Sans" panose="020B0606030504020204" pitchFamily="34" charset="0"/>
                 <a:cs typeface="Courier New" panose="02070309020205020404" pitchFamily="49" charset="0"/>
               </a:rPr>
-              <a:t>95 Dec 121111</a:t>
+              <a:t>1995-12-12T11:11:31Z</a:t>
             </a:r>
           </a:p>
         </p:txBody>
@@ -18827,7 +18827,7 @@
                 <a:ea typeface="Open Sans" panose="020B0606030504020204" pitchFamily="34" charset="0"/>
                 <a:cs typeface="Courier New" panose="02070309020205020404" pitchFamily="49" charset="0"/>
               </a:rPr>
-              <a:t>95 Dec 121112</a:t>
+              <a:t>1995-12-12T11:12:31Z</a:t>
             </a:r>
           </a:p>
         </p:txBody>
@@ -18960,7 +18960,7 @@
                 <a:ea typeface="Open Sans" panose="020B0606030504020204" pitchFamily="34" charset="0"/>
                 <a:cs typeface="Courier New" panose="02070309020205020404" pitchFamily="49" charset="0"/>
               </a:rPr>
-              <a:t>95 Dec 121113</a:t>
+              <a:t>1995-12-12T11:13:31Z</a:t>
             </a:r>
           </a:p>
         </p:txBody>
@@ -19093,7 +19093,7 @@
                 <a:ea typeface="Open Sans" panose="020B0606030504020204" pitchFamily="34" charset="0"/>
                 <a:cs typeface="Courier New" panose="02070309020205020404" pitchFamily="49" charset="0"/>
               </a:rPr>
-              <a:t>95 Dec 121114</a:t>
+              <a:t>1995-12-12T11:14:31Z</a:t>
             </a:r>
           </a:p>
         </p:txBody>
@@ -19226,7 +19226,7 @@
                 <a:ea typeface="Open Sans" panose="020B0606030504020204" pitchFamily="34" charset="0"/>
                 <a:cs typeface="Courier New" panose="02070309020205020404" pitchFamily="49" charset="0"/>
               </a:rPr>
-              <a:t>95 Dec 121115</a:t>
+              <a:t>1995-12-12T11:15:31Z</a:t>
             </a:r>
           </a:p>
         </p:txBody>
@@ -19359,7 +19359,7 @@
                 <a:ea typeface="Open Sans" panose="020B0606030504020204" pitchFamily="34" charset="0"/>
                 <a:cs typeface="Courier New" panose="02070309020205020404" pitchFamily="49" charset="0"/>
               </a:rPr>
-              <a:t>95 Dec 121116</a:t>
+              <a:t>1995-12-12T11:16:31Z</a:t>
             </a:r>
           </a:p>
         </p:txBody>
@@ -19492,7 +19492,7 @@
                 <a:ea typeface="Open Sans" panose="020B0606030504020204" pitchFamily="34" charset="0"/>
                 <a:cs typeface="Courier New" panose="02070309020205020404" pitchFamily="49" charset="0"/>
               </a:rPr>
-              <a:t>95 Dec 121117</a:t>
+              <a:t>1995-12-12T11:17:31Z</a:t>
             </a:r>
           </a:p>
         </p:txBody>
@@ -19625,7 +19625,7 @@
                 <a:ea typeface="Open Sans" panose="020B0606030504020204" pitchFamily="34" charset="0"/>
                 <a:cs typeface="Courier New" panose="02070309020205020404" pitchFamily="49" charset="0"/>
               </a:rPr>
-              <a:t>95 Dec 121118</a:t>
+              <a:t>1995-12-12T11:18:31Z</a:t>
             </a:r>
           </a:p>
         </p:txBody>
@@ -19758,7 +19758,7 @@
                 <a:ea typeface="Open Sans" panose="020B0606030504020204" pitchFamily="34" charset="0"/>
                 <a:cs typeface="Courier New" panose="02070309020205020404" pitchFamily="49" charset="0"/>
               </a:rPr>
-              <a:t>95 Dec 121119</a:t>
+              <a:t>1995-12-12T11:19:31Z</a:t>
             </a:r>
           </a:p>
         </p:txBody>
@@ -19891,7 +19891,7 @@
                 <a:ea typeface="Open Sans" panose="020B0606030504020204" pitchFamily="34" charset="0"/>
                 <a:cs typeface="Courier New" panose="02070309020205020404" pitchFamily="49" charset="0"/>
               </a:rPr>
-              <a:t>95 Dec 121120</a:t>
+              <a:t>1995-12-12T11:20:31Z</a:t>
             </a:r>
           </a:p>
         </p:txBody>
@@ -20024,7 +20024,7 @@
                 <a:ea typeface="Open Sans" panose="020B0606030504020204" pitchFamily="34" charset="0"/>
                 <a:cs typeface="Courier New" panose="02070309020205020404" pitchFamily="49" charset="0"/>
               </a:rPr>
-              <a:t>95 Dec 121121</a:t>
+              <a:t>1995-12-12T11:21:31Z</a:t>
             </a:r>
           </a:p>
         </p:txBody>
@@ -20157,7 +20157,7 @@
                 <a:ea typeface="Open Sans" panose="020B0606030504020204" pitchFamily="34" charset="0"/>
                 <a:cs typeface="Courier New" panose="02070309020205020404" pitchFamily="49" charset="0"/>
               </a:rPr>
-              <a:t>95 Dec 121122</a:t>
+              <a:t>1995-12-12T11:22:31Z</a:t>
             </a:r>
           </a:p>
         </p:txBody>
@@ -20290,7 +20290,7 @@
                 <a:ea typeface="Open Sans" panose="020B0606030504020204" pitchFamily="34" charset="0"/>
                 <a:cs typeface="Courier New" panose="02070309020205020404" pitchFamily="49" charset="0"/>
               </a:rPr>
-              <a:t>95 Dec 121123</a:t>
+              <a:t>1995-12-12T11:23:31Z</a:t>
             </a:r>
           </a:p>
         </p:txBody>
@@ -20423,7 +20423,7 @@
                 <a:ea typeface="Open Sans" panose="020B0606030504020204" pitchFamily="34" charset="0"/>
                 <a:cs typeface="Courier New" panose="02070309020205020404" pitchFamily="49" charset="0"/>
               </a:rPr>
-              <a:t>95 Dec 121124</a:t>
+              <a:t>1995-12-12T11:24:31Z</a:t>
             </a:r>
           </a:p>
         </p:txBody>
@@ -20556,7 +20556,7 @@
                 <a:ea typeface="Open Sans" panose="020B0606030504020204" pitchFamily="34" charset="0"/>
                 <a:cs typeface="Courier New" panose="02070309020205020404" pitchFamily="49" charset="0"/>
               </a:rPr>
-              <a:t>95 Dec 121125</a:t>
+              <a:t>1995-12-12T11:25:31Z</a:t>
             </a:r>
           </a:p>
         </p:txBody>
@@ -20689,7 +20689,7 @@
                 <a:ea typeface="Open Sans" panose="020B0606030504020204" pitchFamily="34" charset="0"/>
                 <a:cs typeface="Courier New" panose="02070309020205020404" pitchFamily="49" charset="0"/>
               </a:rPr>
-              <a:t>95 Dec 121126</a:t>
+              <a:t>1995-12-12T11:26:31Z</a:t>
             </a:r>
           </a:p>
         </p:txBody>
@@ -20822,7 +20822,7 @@
                 <a:ea typeface="Open Sans" panose="020B0606030504020204" pitchFamily="34" charset="0"/>
                 <a:cs typeface="Courier New" panose="02070309020205020404" pitchFamily="49" charset="0"/>
               </a:rPr>
-              <a:t>95 Dec 121127</a:t>
+              <a:t>1995-12-12T11:27:31Z</a:t>
             </a:r>
           </a:p>
         </p:txBody>
@@ -20955,7 +20955,7 @@
                 <a:ea typeface="Open Sans" panose="020B0606030504020204" pitchFamily="34" charset="0"/>
                 <a:cs typeface="Courier New" panose="02070309020205020404" pitchFamily="49" charset="0"/>
               </a:rPr>
-              <a:t>95 Dec 121128</a:t>
+              <a:t>1995-12-12T11:28:31Z</a:t>
             </a:r>
           </a:p>
         </p:txBody>
@@ -21088,7 +21088,7 @@
                 <a:ea typeface="Open Sans" panose="020B0606030504020204" pitchFamily="34" charset="0"/>
                 <a:cs typeface="Courier New" panose="02070309020205020404" pitchFamily="49" charset="0"/>
               </a:rPr>
-              <a:t>95 Dec 121129</a:t>
+              <a:t>1995-12-12T11:29:31Z</a:t>
             </a:r>
           </a:p>
         </p:txBody>
@@ -21221,7 +21221,7 @@
                 <a:ea typeface="Open Sans" panose="020B0606030504020204" pitchFamily="34" charset="0"/>
                 <a:cs typeface="Courier New" panose="02070309020205020404" pitchFamily="49" charset="0"/>
               </a:rPr>
-              <a:t>95 Dec 121130</a:t>
+              <a:t>1995-12-12T11:30:31Z</a:t>
             </a:r>
           </a:p>
         </p:txBody>
@@ -21354,7 +21354,7 @@
                 <a:ea typeface="Open Sans" panose="020B0606030504020204" pitchFamily="34" charset="0"/>
                 <a:cs typeface="Courier New" panose="02070309020205020404" pitchFamily="49" charset="0"/>
               </a:rPr>
-              <a:t>95 Dec 121131</a:t>
+              <a:t>1995-12-12T11:31:31Z</a:t>
             </a:r>
           </a:p>
         </p:txBody>
@@ -21487,7 +21487,7 @@
                 <a:ea typeface="Open Sans" panose="020B0606030504020204" pitchFamily="34" charset="0"/>
                 <a:cs typeface="Courier New" panose="02070309020205020404" pitchFamily="49" charset="0"/>
               </a:rPr>
-              <a:t>95 Dec 121132</a:t>
+              <a:t>1995-12-12T11:32:31Z</a:t>
             </a:r>
           </a:p>
         </p:txBody>
@@ -21620,7 +21620,7 @@
                 <a:ea typeface="Open Sans" panose="020B0606030504020204" pitchFamily="34" charset="0"/>
                 <a:cs typeface="Courier New" panose="02070309020205020404" pitchFamily="49" charset="0"/>
               </a:rPr>
-              <a:t>95 Dec 121133</a:t>
+              <a:t>1995-12-12T11:33:31Z</a:t>
             </a:r>
           </a:p>
         </p:txBody>
@@ -21753,7 +21753,7 @@
                 <a:ea typeface="Open Sans" panose="020B0606030504020204" pitchFamily="34" charset="0"/>
                 <a:cs typeface="Courier New" panose="02070309020205020404" pitchFamily="49" charset="0"/>
               </a:rPr>
-              <a:t>95 Dec 121134</a:t>
+              <a:t>1995-12-12T11:34:31Z</a:t>
             </a:r>
           </a:p>
         </p:txBody>
@@ -21886,7 +21886,7 @@
                 <a:ea typeface="Open Sans" panose="020B0606030504020204" pitchFamily="34" charset="0"/>
                 <a:cs typeface="Courier New" panose="02070309020205020404" pitchFamily="49" charset="0"/>
               </a:rPr>
-              <a:t>95 Dec 121135</a:t>
+              <a:t>1995-12-12T11:35:31Z</a:t>
             </a:r>
           </a:p>
         </p:txBody>
@@ -22019,7 +22019,7 @@
                 <a:ea typeface="Open Sans" panose="020B0606030504020204" pitchFamily="34" charset="0"/>
                 <a:cs typeface="Courier New" panose="02070309020205020404" pitchFamily="49" charset="0"/>
               </a:rPr>
-              <a:t>95 Dec 121136</a:t>
+              <a:t>1995-12-12T11:36:31Z</a:t>
             </a:r>
           </a:p>
         </p:txBody>
@@ -22152,7 +22152,7 @@
                 <a:ea typeface="Open Sans" panose="020B0606030504020204" pitchFamily="34" charset="0"/>
                 <a:cs typeface="Courier New" panose="02070309020205020404" pitchFamily="49" charset="0"/>
               </a:rPr>
-              <a:t>95 Dec 121137</a:t>
+              <a:t>1995-12-12T11:37:31Z</a:t>
             </a:r>
           </a:p>
         </p:txBody>
@@ -22285,7 +22285,7 @@
                 <a:ea typeface="Open Sans" panose="020B0606030504020204" pitchFamily="34" charset="0"/>
                 <a:cs typeface="Courier New" panose="02070309020205020404" pitchFamily="49" charset="0"/>
               </a:rPr>
-              <a:t>95 Dec 121138</a:t>
+              <a:t>1995-12-12T11:38:31Z</a:t>
             </a:r>
           </a:p>
         </p:txBody>
@@ -22418,7 +22418,7 @@
                 <a:ea typeface="Open Sans" panose="020B0606030504020204" pitchFamily="34" charset="0"/>
                 <a:cs typeface="Courier New" panose="02070309020205020404" pitchFamily="49" charset="0"/>
               </a:rPr>
-              <a:t>95 Dec 121139</a:t>
+              <a:t>1995-12-12T11:39:31Z</a:t>
             </a:r>
           </a:p>
         </p:txBody>
@@ -22551,7 +22551,7 @@
                 <a:ea typeface="Open Sans" panose="020B0606030504020204" pitchFamily="34" charset="0"/>
                 <a:cs typeface="Courier New" panose="02070309020205020404" pitchFamily="49" charset="0"/>
               </a:rPr>
-              <a:t>95 Dec 121140</a:t>
+              <a:t>1995-12-12T11:40:31Z</a:t>
             </a:r>
           </a:p>
         </p:txBody>
@@ -22684,7 +22684,7 @@
                 <a:ea typeface="Open Sans" panose="020B0606030504020204" pitchFamily="34" charset="0"/>
                 <a:cs typeface="Courier New" panose="02070309020205020404" pitchFamily="49" charset="0"/>
               </a:rPr>
-              <a:t>95 Dec 121141</a:t>
+              <a:t>1995-12-12T11:41:31Z</a:t>
             </a:r>
           </a:p>
         </p:txBody>
@@ -22794,8 +22794,62 @@
                               <p:cond delay="0"/>
                             </p:stCondLst>
                             <p:childTnLst>
+                              <p:par>
+                                <p:cTn id="8" presetID="1" presetClass="entr" presetSubtype="0" fill="hold" grpId="0" nodeType="withEffect">
+                                  <p:stCondLst>
+                                    <p:cond delay="0"/>
+                                  </p:stCondLst>
+                                  <p:childTnLst>
+                                    <p:set>
+                                      <p:cBhvr>
+                                        <p:cTn id="9" dur="1" fill="hold">
+                                          <p:stCondLst>
+                                            <p:cond delay="0"/>
+                                          </p:stCondLst>
+                                        </p:cTn>
+                                        <p:tgtEl>
+                                          <p:spTgt spid="601"/>
+                                        </p:tgtEl>
+                                        <p:attrNameLst>
+                                          <p:attrName>style.visibility</p:attrName>
+                                        </p:attrNameLst>
+                                      </p:cBhvr>
+                                      <p:to>
+                                        <p:strVal val="visible"/>
+                                      </p:to>
+                                    </p:set>
+                                  </p:childTnLst>
+                                </p:cTn>
+                              </p:par>
+                              <p:par>
+                                <p:cTn id="8" presetID="1" presetClass="entr" presetSubtype="0" fill="hold" grpId="0" nodeType="withEffect">
+                                  <p:stCondLst>
+                                    <p:cond delay="0"/>
+                                  </p:stCondLst>
+                                  <p:childTnLst>
+                                    <p:set>
+                                      <p:cBhvr>
+                                        <p:cTn id="9" dur="1" fill="hold">
+                                          <p:stCondLst>
+                                            <p:cond delay="0"/>
+                                          </p:stCondLst>
+                                        </p:cTn>
+                                        <p:tgtEl>
+                                          <p:spTgt spid="127"/>
+                                        </p:tgtEl>
+                                        <p:attrNameLst>
+                                          <p:attrName>style.visibility</p:attrName>
+                                        </p:attrNameLst>
+                                      </p:cBhvr>
+                                      <p:to>
+                                        <p:strVal val="visible"/>
+                                      </p:to>
+                                    </p:set>
+                                  </p:childTnLst>
+                                </p:cTn>
+                              </p:par>
                               <p:seq>
-                                <p:cTn id="1" presetID="0" presetClass="path" presetSubtype="0" fill="hold" grpId="0" nodeType="clickEffect">
+                                <p:cTn id="1" presetID="0" presetClass="path" presetSubtype="0" fill="hold" grpId="1" nodeType="withEffect">
                                   <p:stCondLst>
                                     <p:cond delay="0"/>
                                   </p:stCondLst>
@@ -23935,7 +23989,7 @@
                                 </p:cTn>
                               </p:seq>
                               <p:seq>
-                                <p:cTn id="2" presetID="0" presetClass="path" presetSubtype="0" fill="hold" grpId="0" nodeType="clickEffect">
+                                <p:cTn id="2" presetID="0" presetClass="path" presetSubtype="0" fill="hold" grpId="1" nodeType="withEffect">
                                   <p:stCondLst>
                                     <p:cond delay="0"/>
                                   </p:stCondLst>

</xml_diff>